<commit_message>
Added link to requirements example in MATLAB webpage
</commit_message>
<xml_diff>
--- a/2_PHASE3_Requirements/docs/2.2 Requirements management in MATLAB_EN.pptx
+++ b/2_PHASE3_Requirements/docs/2.2 Requirements management in MATLAB_EN.pptx
@@ -319,7 +319,7 @@
           <a:p>
             <a:fld id="{DE2F9ED7-D9DF-9B4A-A1AC-9FBF0C9B1C8E}" type="datetime1">
               <a:rPr lang="es-ES" smtClean="0"/>
-              <a:t>29/02/2024</a:t>
+              <a:t>06/03/2024</a:t>
             </a:fld>
             <a:endParaRPr lang="en-US"/>
           </a:p>
@@ -489,7 +489,7 @@
           <a:p>
             <a:fld id="{FEDC53B6-CB23-B545-A702-0812837A95EA}" type="datetime1">
               <a:rPr lang="es-ES" smtClean="0"/>
-              <a:t>29/02/2024</a:t>
+              <a:t>06/03/2024</a:t>
             </a:fld>
             <a:endParaRPr lang="en-US"/>
           </a:p>
@@ -25809,8 +25809,8 @@
         </p:nvSpPr>
         <p:spPr bwMode="auto">
           <a:xfrm>
-            <a:off x="422030" y="2856122"/>
-            <a:ext cx="8299939" cy="1375991"/>
+            <a:off x="422030" y="2486790"/>
+            <a:ext cx="8299939" cy="2114655"/>
           </a:xfrm>
           <a:prstGeom prst="rect">
             <a:avLst/>
@@ -26065,7 +26065,7 @@
                 </a:solidFill>
                 <a:latin typeface="Roboto" panose="02000000000000000000" pitchFamily="2" charset="0"/>
               </a:rPr>
-              <a:t>)</a:t>
+              <a:t> OR Access https://es.mathworks.com/help/slrequirements/gs/link-blocks-and-requirements.html)</a:t>
             </a:r>
             <a:endParaRPr kumimoji="0" lang="es-ES" altLang="es-ES" sz="2400" b="0" i="0" u="none" strike="noStrike" cap="none" normalizeH="0" baseline="0" dirty="0">
               <a:ln>

</xml_diff>